<commit_message>
feat: add capability curve chart slide to short deck
- New slide 6: 'The Gap Is Widening' with AI-first vs everyone else chart
- Image added via PptxGenJS native API (html2pptx has Windows path bug)
- Short deck now 7 slides: intro, starting point, discovery, ground moves,
  productivity explosion, capability curve, new developer

Co-authored-by: Copilot <223556219+Copilot@users.noreply.github.com>
</commit_message>
<xml_diff>
--- a/docs/presentations/marks-journey-short.pptx
+++ b/docs/presentations/marks-journey-short.pptx
@@ -11,9 +11,10 @@
     <p:sldId id="259" r:id="rId5"/>
     <p:sldId id="260" r:id="rId6"/>
     <p:sldId id="261" r:id="rId7"/>
+    <p:sldId id="262" r:id="rId8"/>
   </p:sldIdLst>
   <p:notesMasterIdLst>
-    <p:notesMasterId r:id="rId8"/>
+    <p:notesMasterId r:id="rId9"/>
   </p:notesMasterIdLst>
   <p:sldSz cx="9144000" cy="5143500"/>
   <p:notesSz cx="5143500" cy="9144000"/>
@@ -971,6 +972,94 @@
             <a:fld id="{F7021451-1387-4CA6-816F-3879F97B5CBC}" type="slidenum">
               <a:rPr lang="en-US"/>
               <a:t>6</a:t>
+            </a:fld>
+            <a:endParaRPr lang="en-US"/>
+          </a:p>
+        </p:txBody>
+      </p:sp>
+    </p:spTree>
+    <p:extLst>
+      <p:ext uri="{BB962C8B-B14F-4D97-AF65-F5344CB8AC3E}">
+        <p14:creationId xmlns:p14="http://schemas.microsoft.com/office/powerpoint/2010/main" val="1024086991"/>
+      </p:ext>
+    </p:extLst>
+  </p:cSld>
+  <p:clrMapOvr>
+    <a:masterClrMapping/>
+  </p:clrMapOvr>
+</p:notes>
+</file>
+
+<file path=ppt/notesSlides/notesSlide7.xml><?xml version="1.0" encoding="utf-8"?>
+<p:notes xmlns:a="http://schemas.openxmlformats.org/drawingml/2006/main" xmlns:r="http://schemas.openxmlformats.org/officeDocument/2006/relationships" xmlns:p="http://schemas.openxmlformats.org/presentationml/2006/main">
+  <p:cSld>
+    <p:spTree>
+      <p:nvGrpSpPr>
+        <p:cNvPr id="1" name=""/>
+        <p:cNvGrpSpPr/>
+        <p:nvPr/>
+      </p:nvGrpSpPr>
+      <p:grpSpPr>
+        <a:xfrm>
+          <a:off x="0" y="0"/>
+          <a:ext cx="0" cy="0"/>
+          <a:chOff x="0" y="0"/>
+          <a:chExt cx="0" cy="0"/>
+        </a:xfrm>
+      </p:grpSpPr>
+      <p:sp>
+        <p:nvSpPr>
+          <p:cNvPr id="2" name="Slide Image Placeholder 1"/>
+          <p:cNvSpPr>
+            <a:spLocks noGrp="1" noRot="1" noChangeAspect="1"/>
+          </p:cNvSpPr>
+          <p:nvPr>
+            <p:ph type="sldImg"/>
+          </p:nvPr>
+        </p:nvSpPr>
+        <p:spPr/>
+      </p:sp>
+      <p:sp>
+        <p:nvSpPr>
+          <p:cNvPr id="3" name="Notes Placeholder 2"/>
+          <p:cNvSpPr>
+            <a:spLocks noGrp="1"/>
+          </p:cNvSpPr>
+          <p:nvPr>
+            <p:ph type="body" idx="1"/>
+          </p:nvPr>
+        </p:nvSpPr>
+        <p:spPr/>
+        <p:txBody>
+          <a:bodyPr/>
+          <a:lstStyle/>
+          <a:p>
+            <a:r>
+              <a:rPr lang="en-US" dirty="0"/>
+              <a:t/>
+            </a:r>
+            <a:endParaRPr lang="en-US" dirty="0"/>
+          </a:p>
+        </p:txBody>
+      </p:sp>
+      <p:sp>
+        <p:nvSpPr>
+          <p:cNvPr id="4" name="Slide Number Placeholder 3"/>
+          <p:cNvSpPr>
+            <a:spLocks noGrp="1"/>
+          </p:cNvSpPr>
+          <p:nvPr>
+            <p:ph type="sldNum" sz="quarter" idx="10"/>
+          </p:nvPr>
+        </p:nvSpPr>
+        <p:spPr/>
+        <p:txBody>
+          <a:bodyPr/>
+          <a:lstStyle/>
+          <a:p>
+            <a:fld id="{F7021451-1387-4CA6-816F-3879F97B5CBC}" type="slidenum">
+              <a:rPr lang="en-US"/>
+              <a:t>7</a:t>
             </a:fld>
             <a:endParaRPr lang="en-US"/>
           </a:p>
@@ -2758,6 +2847,196 @@
         </p:nvSpPr>
         <p:spPr>
           <a:xfrm>
+            <a:off x="2908372" y="1887736"/>
+            <a:ext cx="3327255" cy="371475"/>
+          </a:xfrm>
+          <a:prstGeom prst="rect">
+            <a:avLst/>
+          </a:prstGeom>
+          <a:noFill/>
+          <a:ln/>
+        </p:spPr>
+        <p:txBody>
+          <a:bodyPr wrap="square" lIns="0" tIns="0" rIns="0" bIns="0" rtlCol="0" anchor="t"/>
+          <a:lstStyle/>
+          <a:p>
+            <a:pPr algn="ctr" indent="0" marL="0">
+              <a:spcAft>
+                <a:spcPts val="400"/>
+              </a:spcAft>
+              <a:buNone/>
+            </a:pPr>
+            <a:r>
+              <a:rPr lang="en-US" sz="2600" b="1" dirty="0">
+                <a:solidFill>
+                  <a:srgbClr val="FF6B6B"/>
+                </a:solidFill>
+                <a:latin typeface="Arial" pitchFamily="34" charset="0"/>
+                <a:ea typeface="Arial" pitchFamily="34" charset="-122"/>
+                <a:cs typeface="Arial" pitchFamily="34" charset="-120"/>
+              </a:rPr>
+              <a:t>The Gap Is Widening</a:t>
+            </a:r>
+            <a:endParaRPr lang="en-US" sz="2600" dirty="0"/>
+          </a:p>
+        </p:txBody>
+      </p:sp>
+      <p:sp>
+        <p:nvSpPr>
+          <p:cNvPr id="3" name="Text 1"/>
+          <p:cNvSpPr/>
+          <p:nvPr/>
+        </p:nvSpPr>
+        <p:spPr>
+          <a:xfrm>
+            <a:off x="1929993" y="2309961"/>
+            <a:ext cx="5283866" cy="214461"/>
+          </a:xfrm>
+          <a:prstGeom prst="rect">
+            <a:avLst/>
+          </a:prstGeom>
+          <a:noFill/>
+          <a:ln/>
+        </p:spPr>
+        <p:txBody>
+          <a:bodyPr wrap="square" lIns="0" tIns="0" rIns="0" bIns="0" rtlCol="0" anchor="t"/>
+          <a:lstStyle/>
+          <a:p>
+            <a:pPr algn="ctr" indent="0" marL="0">
+              <a:lnSpc>
+                <a:spcPts val="1690"/>
+              </a:lnSpc>
+              <a:spcAft>
+                <a:spcPts val="800"/>
+              </a:spcAft>
+              <a:buNone/>
+            </a:pPr>
+            <a:r>
+              <a:rPr lang="en-US" sz="1300" dirty="0">
+                <a:solidFill>
+                  <a:srgbClr val="B8C0CC"/>
+                </a:solidFill>
+                <a:latin typeface="Arial" pitchFamily="34" charset="0"/>
+                <a:ea typeface="Arial" pitchFamily="34" charset="-122"/>
+                <a:cs typeface="Arial" pitchFamily="34" charset="-120"/>
+              </a:rPr>
+              <a:t>Developers who adopt AI aren't just keeping up — they're pulling away.</a:t>
+            </a:r>
+            <a:endParaRPr lang="en-US" sz="1300" dirty="0"/>
+          </a:p>
+        </p:txBody>
+      </p:sp>
+      <p:sp>
+        <p:nvSpPr>
+          <p:cNvPr id="4" name="Text 2"/>
+          <p:cNvSpPr/>
+          <p:nvPr/>
+        </p:nvSpPr>
+        <p:spPr>
+          <a:xfrm>
+            <a:off x="1867905" y="2702123"/>
+            <a:ext cx="5408042" cy="198090"/>
+          </a:xfrm>
+          <a:prstGeom prst="rect">
+            <a:avLst/>
+          </a:prstGeom>
+          <a:noFill/>
+          <a:ln/>
+        </p:spPr>
+        <p:txBody>
+          <a:bodyPr wrap="square" lIns="0" tIns="0" rIns="0" bIns="0" rtlCol="0" anchor="t"/>
+          <a:lstStyle/>
+          <a:p>
+            <a:pPr algn="ctr" indent="0" marL="0">
+              <a:lnSpc>
+                <a:spcPts val="1560"/>
+              </a:lnSpc>
+              <a:spcBef>
+                <a:spcPts val="600"/>
+              </a:spcBef>
+              <a:spcAft>
+                <a:spcPts val="800"/>
+              </a:spcAft>
+              <a:buNone/>
+            </a:pPr>
+            <a:r>
+              <a:rPr lang="en-US" sz="1200" b="1" dirty="0">
+                <a:solidFill>
+                  <a:srgbClr val="5EA8A7"/>
+                </a:solidFill>
+                <a:latin typeface="Arial" pitchFamily="34" charset="0"/>
+                <a:ea typeface="Arial" pitchFamily="34" charset="-122"/>
+                <a:cs typeface="Arial" pitchFamily="34" charset="-120"/>
+              </a:rPr>
+              <a:t>AI-first developers ride the capability curve. Everyone else falls behind it.</a:t>
+            </a:r>
+            <a:endParaRPr lang="en-US" sz="1200" dirty="0"/>
+          </a:p>
+        </p:txBody>
+      </p:sp>
+      <p:pic>
+        <p:nvPicPr>
+          <p:cNvPr id="5" name="Image 0" descr="C:\Users\cirvine\code\work\editless.wt\leadership-presentation\docs\presentations\workspace\short\capability-curve.png">    </p:cNvPr>
+          <p:cNvPicPr>
+            <a:picLocks noChangeAspect="1"/>
+          </p:cNvPicPr>
+          <p:nvPr/>
+        </p:nvPicPr>
+        <p:blipFill>
+          <a:blip r:embed="rId1"/>
+          <a:srcRect l="0" r="0" t="0" b="0"/>
+          <a:stretch/>
+        </p:blipFill>
+        <p:spPr>
+          <a:xfrm>
+            <a:off x="1097280" y="1188720"/>
+            <a:ext cx="6949440" cy="3200400"/>
+          </a:xfrm>
+          <a:prstGeom prst="rect">
+            <a:avLst/>
+          </a:prstGeom>
+        </p:spPr>
+      </p:pic>
+    </p:spTree>
+  </p:cSld>
+  <p:clrMapOvr>
+    <a:masterClrMapping/>
+  </p:clrMapOvr>
+</p:sld>
+</file>
+
+<file path=ppt/slides/slide7.xml><?xml version="1.0" encoding="utf-8"?>
+<p:sld xmlns:a="http://schemas.openxmlformats.org/drawingml/2006/main" xmlns:r="http://schemas.openxmlformats.org/officeDocument/2006/relationships" xmlns:p="http://schemas.openxmlformats.org/presentationml/2006/main">
+  <p:cSld name="Slide 7">
+    <p:bg>
+      <p:bgPr>
+        <a:solidFill>
+          <a:srgbClr val="1C1C2E"/>
+        </a:solidFill>
+      </p:bgPr>
+    </p:bg>
+    <p:spTree>
+      <p:nvGrpSpPr>
+        <p:cNvPr id="1" name=""/>
+        <p:cNvGrpSpPr/>
+        <p:nvPr/>
+      </p:nvGrpSpPr>
+      <p:grpSpPr>
+        <a:xfrm>
+          <a:off x="0" y="0"/>
+          <a:ext cx="0" cy="0"/>
+          <a:chOff x="0" y="0"/>
+          <a:chExt cx="0" cy="0"/>
+        </a:xfrm>
+      </p:grpSpPr>
+      <p:sp>
+        <p:nvSpPr>
+          <p:cNvPr id="2" name="Text 0"/>
+          <p:cNvSpPr/>
+          <p:nvPr/>
+        </p:nvSpPr>
+        <p:spPr>
+          <a:xfrm>
             <a:off x="634901" y="739527"/>
             <a:ext cx="4062901" cy="495300"/>
           </a:xfrm>

</xml_diff>

<commit_message>
feat: update slide 7 tagline to 'Less time writing code. More time shaping outcomes.'
Co-authored-by: Copilot <223556219+Copilot@users.noreply.github.com>
</commit_message>
<xml_diff>
--- a/docs/presentations/marks-journey-short.pptx
+++ b/docs/presentations/marks-journey-short.pptx
@@ -3037,7 +3037,7 @@
         </p:nvSpPr>
         <p:spPr>
           <a:xfrm>
-            <a:off x="634901" y="739527"/>
+            <a:off x="634901" y="908298"/>
             <a:ext cx="4062901" cy="495300"/>
           </a:xfrm>
           <a:prstGeom prst="rect">
@@ -3079,7 +3079,7 @@
         </p:nvSpPr>
         <p:spPr>
           <a:xfrm>
-            <a:off x="634901" y="1552277"/>
+            <a:off x="634901" y="1721048"/>
             <a:ext cx="8031682" cy="906810"/>
           </a:xfrm>
           <a:prstGeom prst="rect">
@@ -3124,7 +3124,7 @@
         </p:nvSpPr>
         <p:spPr>
           <a:xfrm>
-            <a:off x="634901" y="2839938"/>
+            <a:off x="634901" y="3008709"/>
             <a:ext cx="4473229" cy="304651"/>
           </a:xfrm>
           <a:prstGeom prst="rect">
@@ -3172,8 +3172,8 @@
         </p:nvSpPr>
         <p:spPr>
           <a:xfrm>
-            <a:off x="634901" y="3550890"/>
-            <a:ext cx="8031682" cy="675382"/>
+            <a:off x="634901" y="3719661"/>
+            <a:ext cx="6263006" cy="337691"/>
           </a:xfrm>
           <a:prstGeom prst="rect">
             <a:avLst/>
@@ -3206,7 +3206,7 @@
                 <a:ea typeface="Arial" pitchFamily="34" charset="-122"/>
                 <a:cs typeface="Arial" pitchFamily="34" charset="-120"/>
               </a:rPr>
-              <a:t>The craft shifts from "how do I write this?" to "who should write this, and what are the constraints?"</a:t>
+              <a:t>Less time writing code. More time shaping outcomes.</a:t>
             </a:r>
             <a:endParaRPr lang="en-US" sz="1900" dirty="0"/>
           </a:p>

</xml_diff>